<commit_message>
update to chapter 26, but 26 is not finished
</commit_message>
<xml_diff>
--- a/MySQL实战/24MySQL是怎么保证主备一致的？.pptx
+++ b/MySQL实战/24MySQL是怎么保证主备一致的？.pptx
@@ -204,7 +204,7 @@
           <a:p>
             <a:fld id="{A900F2CD-AD8F-46FC-AAAB-A0D218D6826F}" type="datetimeFigureOut">
               <a:rPr lang="zh-CN" altLang="en-US" smtClean="0"/>
-              <a:t>2019/5/27</a:t>
+              <a:t>2019/5/28</a:t>
             </a:fld>
             <a:endParaRPr lang="zh-CN" altLang="en-US"/>
           </a:p>
@@ -1246,7 +1246,7 @@
           <a:p>
             <a:fld id="{E396512D-F96B-4538-B91A-F7EB57A489A0}" type="datetimeFigureOut">
               <a:rPr lang="zh-CN" altLang="en-US" smtClean="0"/>
-              <a:t>2019/5/27</a:t>
+              <a:t>2019/5/28</a:t>
             </a:fld>
             <a:endParaRPr lang="zh-CN" altLang="en-US"/>
           </a:p>
@@ -1521,7 +1521,7 @@
           <a:p>
             <a:fld id="{E396512D-F96B-4538-B91A-F7EB57A489A0}" type="datetimeFigureOut">
               <a:rPr lang="zh-CN" altLang="en-US" smtClean="0"/>
-              <a:t>2019/5/27</a:t>
+              <a:t>2019/5/28</a:t>
             </a:fld>
             <a:endParaRPr lang="zh-CN" altLang="en-US"/>
           </a:p>
@@ -1715,7 +1715,7 @@
           <a:p>
             <a:fld id="{E396512D-F96B-4538-B91A-F7EB57A489A0}" type="datetimeFigureOut">
               <a:rPr lang="zh-CN" altLang="en-US" smtClean="0"/>
-              <a:t>2019/5/27</a:t>
+              <a:t>2019/5/28</a:t>
             </a:fld>
             <a:endParaRPr lang="zh-CN" altLang="en-US"/>
           </a:p>
@@ -1988,7 +1988,7 @@
           <a:p>
             <a:fld id="{E396512D-F96B-4538-B91A-F7EB57A489A0}" type="datetimeFigureOut">
               <a:rPr lang="zh-CN" altLang="en-US" smtClean="0"/>
-              <a:t>2019/5/27</a:t>
+              <a:t>2019/5/28</a:t>
             </a:fld>
             <a:endParaRPr lang="zh-CN" altLang="en-US"/>
           </a:p>
@@ -2329,7 +2329,7 @@
           <a:p>
             <a:fld id="{E396512D-F96B-4538-B91A-F7EB57A489A0}" type="datetimeFigureOut">
               <a:rPr lang="zh-CN" altLang="en-US" smtClean="0"/>
-              <a:t>2019/5/27</a:t>
+              <a:t>2019/5/28</a:t>
             </a:fld>
             <a:endParaRPr lang="zh-CN" altLang="en-US"/>
           </a:p>
@@ -2952,7 +2952,7 @@
           <a:p>
             <a:fld id="{E396512D-F96B-4538-B91A-F7EB57A489A0}" type="datetimeFigureOut">
               <a:rPr lang="zh-CN" altLang="en-US" smtClean="0"/>
-              <a:t>2019/5/27</a:t>
+              <a:t>2019/5/28</a:t>
             </a:fld>
             <a:endParaRPr lang="zh-CN" altLang="en-US"/>
           </a:p>
@@ -3812,7 +3812,7 @@
           <a:p>
             <a:fld id="{E396512D-F96B-4538-B91A-F7EB57A489A0}" type="datetimeFigureOut">
               <a:rPr lang="zh-CN" altLang="en-US" smtClean="0"/>
-              <a:t>2019/5/27</a:t>
+              <a:t>2019/5/28</a:t>
             </a:fld>
             <a:endParaRPr lang="zh-CN" altLang="en-US"/>
           </a:p>
@@ -3982,7 +3982,7 @@
           <a:p>
             <a:fld id="{E396512D-F96B-4538-B91A-F7EB57A489A0}" type="datetimeFigureOut">
               <a:rPr lang="zh-CN" altLang="en-US" smtClean="0"/>
-              <a:t>2019/5/27</a:t>
+              <a:t>2019/5/28</a:t>
             </a:fld>
             <a:endParaRPr lang="zh-CN" altLang="en-US"/>
           </a:p>
@@ -4162,7 +4162,7 @@
           <a:p>
             <a:fld id="{E396512D-F96B-4538-B91A-F7EB57A489A0}" type="datetimeFigureOut">
               <a:rPr lang="zh-CN" altLang="en-US" smtClean="0"/>
-              <a:t>2019/5/27</a:t>
+              <a:t>2019/5/28</a:t>
             </a:fld>
             <a:endParaRPr lang="zh-CN" altLang="en-US"/>
           </a:p>
@@ -4332,7 +4332,7 @@
           <a:p>
             <a:fld id="{E396512D-F96B-4538-B91A-F7EB57A489A0}" type="datetimeFigureOut">
               <a:rPr lang="zh-CN" altLang="en-US" smtClean="0"/>
-              <a:t>2019/5/27</a:t>
+              <a:t>2019/5/28</a:t>
             </a:fld>
             <a:endParaRPr lang="zh-CN" altLang="en-US"/>
           </a:p>
@@ -4579,7 +4579,7 @@
           <a:p>
             <a:fld id="{E396512D-F96B-4538-B91A-F7EB57A489A0}" type="datetimeFigureOut">
               <a:rPr lang="zh-CN" altLang="en-US" smtClean="0"/>
-              <a:t>2019/5/27</a:t>
+              <a:t>2019/5/28</a:t>
             </a:fld>
             <a:endParaRPr lang="zh-CN" altLang="en-US"/>
           </a:p>
@@ -4871,7 +4871,7 @@
           <a:p>
             <a:fld id="{E396512D-F96B-4538-B91A-F7EB57A489A0}" type="datetimeFigureOut">
               <a:rPr lang="zh-CN" altLang="en-US" smtClean="0"/>
-              <a:t>2019/5/27</a:t>
+              <a:t>2019/5/28</a:t>
             </a:fld>
             <a:endParaRPr lang="zh-CN" altLang="en-US"/>
           </a:p>
@@ -5315,7 +5315,7 @@
           <a:p>
             <a:fld id="{E396512D-F96B-4538-B91A-F7EB57A489A0}" type="datetimeFigureOut">
               <a:rPr lang="zh-CN" altLang="en-US" smtClean="0"/>
-              <a:t>2019/5/27</a:t>
+              <a:t>2019/5/28</a:t>
             </a:fld>
             <a:endParaRPr lang="zh-CN" altLang="en-US"/>
           </a:p>
@@ -5433,7 +5433,7 @@
           <a:p>
             <a:fld id="{E396512D-F96B-4538-B91A-F7EB57A489A0}" type="datetimeFigureOut">
               <a:rPr lang="zh-CN" altLang="en-US" smtClean="0"/>
-              <a:t>2019/5/27</a:t>
+              <a:t>2019/5/28</a:t>
             </a:fld>
             <a:endParaRPr lang="zh-CN" altLang="en-US"/>
           </a:p>
@@ -5528,7 +5528,7 @@
           <a:p>
             <a:fld id="{E396512D-F96B-4538-B91A-F7EB57A489A0}" type="datetimeFigureOut">
               <a:rPr lang="zh-CN" altLang="en-US" smtClean="0"/>
-              <a:t>2019/5/27</a:t>
+              <a:t>2019/5/28</a:t>
             </a:fld>
             <a:endParaRPr lang="zh-CN" altLang="en-US"/>
           </a:p>
@@ -5807,7 +5807,7 @@
           <a:p>
             <a:fld id="{E396512D-F96B-4538-B91A-F7EB57A489A0}" type="datetimeFigureOut">
               <a:rPr lang="zh-CN" altLang="en-US" smtClean="0"/>
-              <a:t>2019/5/27</a:t>
+              <a:t>2019/5/28</a:t>
             </a:fld>
             <a:endParaRPr lang="zh-CN" altLang="en-US"/>
           </a:p>
@@ -6082,7 +6082,7 @@
           <a:p>
             <a:fld id="{E396512D-F96B-4538-B91A-F7EB57A489A0}" type="datetimeFigureOut">
               <a:rPr lang="zh-CN" altLang="en-US" smtClean="0"/>
-              <a:t>2019/5/27</a:t>
+              <a:t>2019/5/28</a:t>
             </a:fld>
             <a:endParaRPr lang="zh-CN" altLang="en-US"/>
           </a:p>
@@ -6511,7 +6511,7 @@
           <a:p>
             <a:fld id="{E396512D-F96B-4538-B91A-F7EB57A489A0}" type="datetimeFigureOut">
               <a:rPr lang="zh-CN" altLang="en-US" smtClean="0"/>
-              <a:t>2019/5/27</a:t>
+              <a:t>2019/5/28</a:t>
             </a:fld>
             <a:endParaRPr lang="zh-CN" altLang="en-US"/>
           </a:p>
@@ -7073,10 +7073,6 @@
               </a:rPr>
               <a:t>是怎么保证主备一致的？</a:t>
             </a:r>
-            <a:endParaRPr lang="zh-CN" altLang="en-US" sz="3200" b="1" dirty="0">
-              <a:latin typeface="微软雅黑" panose="020B0503020204020204" pitchFamily="34" charset="-122"/>
-              <a:ea typeface="微软雅黑" panose="020B0503020204020204" pitchFamily="34" charset="-122"/>
-            </a:endParaRPr>
           </a:p>
         </p:txBody>
       </p:sp>
@@ -7332,10 +7328,6 @@
               </a:rPr>
               <a:t>insert into t values(5,5,'2018-11-09');</a:t>
             </a:r>
-            <a:endParaRPr lang="en-US" altLang="zh-CN" sz="1400" dirty="0">
-              <a:latin typeface="微软雅黑" panose="020B0503020204020204" pitchFamily="34" charset="-122"/>
-              <a:ea typeface="微软雅黑" panose="020B0503020204020204" pitchFamily="34" charset="-122"/>
-            </a:endParaRPr>
           </a:p>
         </p:txBody>
       </p:sp>
@@ -7410,10 +7402,6 @@
               </a:rPr>
               <a:t>是怎么保证主备一致的？</a:t>
             </a:r>
-            <a:endParaRPr lang="zh-CN" altLang="en-US" sz="3200" b="1" dirty="0">
-              <a:latin typeface="微软雅黑" panose="020B0503020204020204" pitchFamily="34" charset="-122"/>
-              <a:ea typeface="微软雅黑" panose="020B0503020204020204" pitchFamily="34" charset="-122"/>
-            </a:endParaRPr>
           </a:p>
         </p:txBody>
       </p:sp>
@@ -8073,13 +8061,6 @@
               </a:rPr>
               <a:t>1</a:t>
             </a:r>
-            <a:endParaRPr lang="en-US" altLang="zh-CN" sz="1600" dirty="0" smtClean="0">
-              <a:solidFill>
-                <a:srgbClr val="FFFF00"/>
-              </a:solidFill>
-              <a:latin typeface="微软雅黑" panose="020B0503020204020204" pitchFamily="34" charset="-122"/>
-              <a:ea typeface="微软雅黑" panose="020B0503020204020204" pitchFamily="34" charset="-122"/>
-            </a:endParaRPr>
           </a:p>
         </p:txBody>
       </p:sp>
@@ -8124,13 +8105,6 @@
               </a:rPr>
               <a:t>2</a:t>
             </a:r>
-            <a:endParaRPr lang="en-US" altLang="zh-CN" sz="1600" dirty="0" smtClean="0">
-              <a:solidFill>
-                <a:srgbClr val="FFFF00"/>
-              </a:solidFill>
-              <a:latin typeface="微软雅黑" panose="020B0503020204020204" pitchFamily="34" charset="-122"/>
-              <a:ea typeface="微软雅黑" panose="020B0503020204020204" pitchFamily="34" charset="-122"/>
-            </a:endParaRPr>
           </a:p>
         </p:txBody>
       </p:sp>
@@ -8513,14 +8487,7 @@
                 <a:latin typeface="微软雅黑" panose="020B0503020204020204" pitchFamily="34" charset="-122"/>
                 <a:ea typeface="微软雅黑" panose="020B0503020204020204" pitchFamily="34" charset="-122"/>
               </a:rPr>
-              <a:t>更新</a:t>
-            </a:r>
-            <a:r>
-              <a:rPr lang="zh-CN" altLang="en-US" sz="1200" dirty="0" smtClean="0">
-                <a:latin typeface="微软雅黑" panose="020B0503020204020204" pitchFamily="34" charset="-122"/>
-                <a:ea typeface="微软雅黑" panose="020B0503020204020204" pitchFamily="34" charset="-122"/>
-              </a:rPr>
-              <a:t>线程拥有超级权限。</a:t>
+              <a:t>更新线程拥有超级权限。</a:t>
             </a:r>
             <a:endParaRPr lang="en-US" altLang="zh-CN" sz="1200" dirty="0">
               <a:latin typeface="微软雅黑" panose="020B0503020204020204" pitchFamily="34" charset="-122"/>
@@ -8646,10 +8613,6 @@
               </a:rPr>
               <a:t>是怎么保证主备一致的？</a:t>
             </a:r>
-            <a:endParaRPr lang="zh-CN" altLang="en-US" sz="3200" b="1" dirty="0">
-              <a:latin typeface="微软雅黑" panose="020B0503020204020204" pitchFamily="34" charset="-122"/>
-              <a:ea typeface="微软雅黑" panose="020B0503020204020204" pitchFamily="34" charset="-122"/>
-            </a:endParaRPr>
           </a:p>
         </p:txBody>
       </p:sp>
@@ -9803,11 +9766,11 @@
           <a:p>
             <a:pPr algn="ctr"/>
             <a:r>
-              <a:rPr lang="en-US" altLang="zh-CN" sz="1400" dirty="0" smtClean="0">
-                <a:latin typeface="微软雅黑" panose="020B0503020204020204" pitchFamily="34" charset="-122"/>
-                <a:ea typeface="微软雅黑" panose="020B0503020204020204" pitchFamily="34" charset="-122"/>
-              </a:rPr>
-              <a:t>start</a:t>
+              <a:rPr lang="en-US" altLang="zh-CN" sz="1400" dirty="0" err="1" smtClean="0">
+                <a:latin typeface="微软雅黑" panose="020B0503020204020204" pitchFamily="34" charset="-122"/>
+                <a:ea typeface="微软雅黑" panose="020B0503020204020204" pitchFamily="34" charset="-122"/>
+              </a:rPr>
+              <a:t>ack</a:t>
             </a:r>
             <a:endParaRPr lang="zh-CN" altLang="en-US" sz="1400" dirty="0">
               <a:latin typeface="微软雅黑" panose="020B0503020204020204" pitchFamily="34" charset="-122"/>
@@ -10355,13 +10318,6 @@
               </a:rPr>
               <a:t>master A</a:t>
             </a:r>
-            <a:endParaRPr lang="en-US" altLang="zh-CN" sz="1600" dirty="0" smtClean="0">
-              <a:solidFill>
-                <a:srgbClr val="FFFF00"/>
-              </a:solidFill>
-              <a:latin typeface="微软雅黑" panose="020B0503020204020204" pitchFamily="34" charset="-122"/>
-              <a:ea typeface="微软雅黑" panose="020B0503020204020204" pitchFamily="34" charset="-122"/>
-            </a:endParaRPr>
           </a:p>
         </p:txBody>
       </p:sp>
@@ -10396,13 +10352,6 @@
               </a:rPr>
               <a:t>slave B</a:t>
             </a:r>
-            <a:endParaRPr lang="en-US" altLang="zh-CN" sz="1600" dirty="0" smtClean="0">
-              <a:solidFill>
-                <a:srgbClr val="FFFF00"/>
-              </a:solidFill>
-              <a:latin typeface="微软雅黑" panose="020B0503020204020204" pitchFamily="34" charset="-122"/>
-              <a:ea typeface="微软雅黑" panose="020B0503020204020204" pitchFamily="34" charset="-122"/>
-            </a:endParaRPr>
           </a:p>
         </p:txBody>
       </p:sp>
@@ -10477,10 +10426,6 @@
               </a:rPr>
               <a:t>是怎么保证主备一致的？</a:t>
             </a:r>
-            <a:endParaRPr lang="zh-CN" altLang="en-US" sz="3200" b="1" dirty="0">
-              <a:latin typeface="微软雅黑" panose="020B0503020204020204" pitchFamily="34" charset="-122"/>
-              <a:ea typeface="微软雅黑" panose="020B0503020204020204" pitchFamily="34" charset="-122"/>
-            </a:endParaRPr>
           </a:p>
         </p:txBody>
       </p:sp>
@@ -11438,10 +11383,6 @@
               </a:rPr>
               <a:t>是怎么保证主备一致的？</a:t>
             </a:r>
-            <a:endParaRPr lang="zh-CN" altLang="en-US" sz="3200" b="1" dirty="0">
-              <a:latin typeface="微软雅黑" panose="020B0503020204020204" pitchFamily="34" charset="-122"/>
-              <a:ea typeface="微软雅黑" panose="020B0503020204020204" pitchFamily="34" charset="-122"/>
-            </a:endParaRPr>
           </a:p>
         </p:txBody>
       </p:sp>
@@ -12098,10 +12039,6 @@
               </a:rPr>
               <a:t>是怎么保证主备一致的？</a:t>
             </a:r>
-            <a:endParaRPr lang="zh-CN" altLang="en-US" sz="3200" b="1" dirty="0">
-              <a:latin typeface="微软雅黑" panose="020B0503020204020204" pitchFamily="34" charset="-122"/>
-              <a:ea typeface="微软雅黑" panose="020B0503020204020204" pitchFamily="34" charset="-122"/>
-            </a:endParaRPr>
           </a:p>
         </p:txBody>
       </p:sp>
@@ -13463,10 +13400,6 @@
               </a:rPr>
               <a:t>是怎么保证主备一致的？</a:t>
             </a:r>
-            <a:endParaRPr lang="zh-CN" altLang="en-US" sz="3200" b="1" dirty="0">
-              <a:latin typeface="微软雅黑" panose="020B0503020204020204" pitchFamily="34" charset="-122"/>
-              <a:ea typeface="微软雅黑" panose="020B0503020204020204" pitchFamily="34" charset="-122"/>
-            </a:endParaRPr>
           </a:p>
         </p:txBody>
       </p:sp>
@@ -14719,10 +14652,6 @@
               </a:rPr>
               <a:t>是怎么保证主备一致的？</a:t>
             </a:r>
-            <a:endParaRPr lang="zh-CN" altLang="en-US" sz="3200" b="1" dirty="0">
-              <a:latin typeface="微软雅黑" panose="020B0503020204020204" pitchFamily="34" charset="-122"/>
-              <a:ea typeface="微软雅黑" panose="020B0503020204020204" pitchFamily="34" charset="-122"/>
-            </a:endParaRPr>
           </a:p>
         </p:txBody>
       </p:sp>
@@ -15382,13 +15311,6 @@
               </a:rPr>
               <a:t>1</a:t>
             </a:r>
-            <a:endParaRPr lang="en-US" altLang="zh-CN" sz="1600" dirty="0" smtClean="0">
-              <a:solidFill>
-                <a:srgbClr val="FFFF00"/>
-              </a:solidFill>
-              <a:latin typeface="微软雅黑" panose="020B0503020204020204" pitchFamily="34" charset="-122"/>
-              <a:ea typeface="微软雅黑" panose="020B0503020204020204" pitchFamily="34" charset="-122"/>
-            </a:endParaRPr>
           </a:p>
         </p:txBody>
       </p:sp>
@@ -15433,13 +15355,6 @@
               </a:rPr>
               <a:t>2</a:t>
             </a:r>
-            <a:endParaRPr lang="en-US" altLang="zh-CN" sz="1600" dirty="0" smtClean="0">
-              <a:solidFill>
-                <a:srgbClr val="FFFF00"/>
-              </a:solidFill>
-              <a:latin typeface="微软雅黑" panose="020B0503020204020204" pitchFamily="34" charset="-122"/>
-              <a:ea typeface="微软雅黑" panose="020B0503020204020204" pitchFamily="34" charset="-122"/>
-            </a:endParaRPr>
           </a:p>
         </p:txBody>
       </p:sp>
@@ -15546,7 +15461,7 @@
         <p:spPr>
           <a:xfrm>
             <a:off x="215538" y="5334892"/>
-            <a:ext cx="6908798" cy="954107"/>
+            <a:ext cx="6908798" cy="1384995"/>
           </a:xfrm>
           <a:prstGeom prst="rect">
             <a:avLst/>
@@ -15766,7 +15681,7 @@
               <a:t>server id</a:t>
             </a:r>
             <a:r>
-              <a:rPr lang="zh-CN" altLang="en-US" sz="1400" smtClean="0">
+              <a:rPr lang="zh-CN" altLang="en-US" sz="1400" dirty="0" smtClean="0">
                 <a:solidFill>
                   <a:srgbClr val="FFFF00"/>
                 </a:solidFill>
@@ -15774,6 +15689,104 @@
                 <a:ea typeface="微软雅黑" panose="020B0503020204020204" pitchFamily="34" charset="-122"/>
               </a:rPr>
               <a:t>，如果相同表示是自己生成的，直接丢弃。</a:t>
+            </a:r>
+            <a:endParaRPr lang="en-US" altLang="zh-CN" sz="1400" dirty="0" smtClean="0">
+              <a:solidFill>
+                <a:srgbClr val="FFFF00"/>
+              </a:solidFill>
+              <a:latin typeface="微软雅黑" panose="020B0503020204020204" pitchFamily="34" charset="-122"/>
+              <a:ea typeface="微软雅黑" panose="020B0503020204020204" pitchFamily="34" charset="-122"/>
+            </a:endParaRPr>
+          </a:p>
+          <a:p>
+            <a:endParaRPr lang="en-US" altLang="zh-CN" sz="1400" dirty="0">
+              <a:solidFill>
+                <a:srgbClr val="FFFF00"/>
+              </a:solidFill>
+              <a:latin typeface="微软雅黑" panose="020B0503020204020204" pitchFamily="34" charset="-122"/>
+              <a:ea typeface="微软雅黑" panose="020B0503020204020204" pitchFamily="34" charset="-122"/>
+            </a:endParaRPr>
+          </a:p>
+          <a:p>
+            <a:r>
+              <a:rPr lang="zh-CN" altLang="en-US" sz="1400" dirty="0" smtClean="0">
+                <a:solidFill>
+                  <a:srgbClr val="FFFF00"/>
+                </a:solidFill>
+                <a:latin typeface="微软雅黑" panose="020B0503020204020204" pitchFamily="34" charset="-122"/>
+                <a:ea typeface="微软雅黑" panose="020B0503020204020204" pitchFamily="34" charset="-122"/>
+              </a:rPr>
+              <a:t>千万不要随意使用命令 </a:t>
+            </a:r>
+            <a:r>
+              <a:rPr lang="en-US" altLang="zh-CN" sz="1400" dirty="0" smtClean="0">
+                <a:solidFill>
+                  <a:srgbClr val="FFFF00"/>
+                </a:solidFill>
+                <a:latin typeface="微软雅黑" panose="020B0503020204020204" pitchFamily="34" charset="-122"/>
+                <a:ea typeface="微软雅黑" panose="020B0503020204020204" pitchFamily="34" charset="-122"/>
+              </a:rPr>
+              <a:t>set global </a:t>
+            </a:r>
+            <a:r>
+              <a:rPr lang="en-US" altLang="zh-CN" sz="1400" dirty="0" err="1" smtClean="0">
+                <a:solidFill>
+                  <a:srgbClr val="FFFF00"/>
+                </a:solidFill>
+                <a:latin typeface="微软雅黑" panose="020B0503020204020204" pitchFamily="34" charset="-122"/>
+                <a:ea typeface="微软雅黑" panose="020B0503020204020204" pitchFamily="34" charset="-122"/>
+              </a:rPr>
+              <a:t>server_id</a:t>
+            </a:r>
+            <a:r>
+              <a:rPr lang="en-US" altLang="zh-CN" sz="1400" dirty="0" smtClean="0">
+                <a:solidFill>
+                  <a:srgbClr val="FFFF00"/>
+                </a:solidFill>
+                <a:latin typeface="微软雅黑" panose="020B0503020204020204" pitchFamily="34" charset="-122"/>
+                <a:ea typeface="微软雅黑" panose="020B0503020204020204" pitchFamily="34" charset="-122"/>
+              </a:rPr>
+              <a:t>=x</a:t>
+            </a:r>
+            <a:r>
+              <a:rPr lang="zh-CN" altLang="en-US" sz="1400" dirty="0">
+                <a:solidFill>
+                  <a:srgbClr val="FFFF00"/>
+                </a:solidFill>
+                <a:latin typeface="微软雅黑" panose="020B0503020204020204" pitchFamily="34" charset="-122"/>
+                <a:ea typeface="微软雅黑" panose="020B0503020204020204" pitchFamily="34" charset="-122"/>
+              </a:rPr>
+              <a:t> </a:t>
+            </a:r>
+            <a:r>
+              <a:rPr lang="zh-CN" altLang="en-US" sz="1400" dirty="0" smtClean="0">
+                <a:solidFill>
+                  <a:srgbClr val="FFFF00"/>
+                </a:solidFill>
+                <a:latin typeface="微软雅黑" panose="020B0503020204020204" pitchFamily="34" charset="-122"/>
+                <a:ea typeface="微软雅黑" panose="020B0503020204020204" pitchFamily="34" charset="-122"/>
+              </a:rPr>
+              <a:t>来修改</a:t>
+            </a:r>
+            <a:r>
+              <a:rPr lang="en-US" altLang="zh-CN" sz="1400" dirty="0" err="1" smtClean="0">
+                <a:solidFill>
+                  <a:srgbClr val="FFFF00"/>
+                </a:solidFill>
+                <a:latin typeface="微软雅黑" panose="020B0503020204020204" pitchFamily="34" charset="-122"/>
+                <a:ea typeface="微软雅黑" panose="020B0503020204020204" pitchFamily="34" charset="-122"/>
+              </a:rPr>
+              <a:t>server_id</a:t>
+            </a:r>
+            <a:r>
+              <a:rPr lang="zh-CN" altLang="en-US" sz="1400">
+                <a:solidFill>
+                  <a:srgbClr val="FFFF00"/>
+                </a:solidFill>
+                <a:latin typeface="微软雅黑" panose="020B0503020204020204" pitchFamily="34" charset="-122"/>
+                <a:ea typeface="微软雅黑" panose="020B0503020204020204" pitchFamily="34" charset="-122"/>
+              </a:rPr>
+              <a:t>。</a:t>
             </a:r>
             <a:endParaRPr lang="en-US" altLang="zh-CN" sz="1400" dirty="0" smtClean="0">
               <a:solidFill>
@@ -15862,14 +15875,7 @@
                 <a:latin typeface="微软雅黑" panose="020B0503020204020204" pitchFamily="34" charset="-122"/>
                 <a:ea typeface="微软雅黑" panose="020B0503020204020204" pitchFamily="34" charset="-122"/>
               </a:rPr>
-              <a:t>更新</a:t>
-            </a:r>
-            <a:r>
-              <a:rPr lang="zh-CN" altLang="en-US" sz="1200" dirty="0" smtClean="0">
-                <a:latin typeface="微软雅黑" panose="020B0503020204020204" pitchFamily="34" charset="-122"/>
-                <a:ea typeface="微软雅黑" panose="020B0503020204020204" pitchFamily="34" charset="-122"/>
-              </a:rPr>
-              <a:t>线程拥有超级权限。</a:t>
+              <a:t>更新线程拥有超级权限。</a:t>
             </a:r>
             <a:endParaRPr lang="en-US" altLang="zh-CN" sz="1200" dirty="0">
               <a:latin typeface="微软雅黑" panose="020B0503020204020204" pitchFamily="34" charset="-122"/>

</xml_diff>